<commit_message>
Proof reading done till ch 3
</commit_message>
<xml_diff>
--- a/ch02_background/figures/ChalanExample.pptx
+++ b/ch02_background/figures/ChalanExample.pptx
@@ -255,7 +255,7 @@
           <a:p>
             <a:fld id="{61F798F5-E9CA-274B-A771-0DC0BC9217C2}" type="datetimeFigureOut">
               <a:rPr lang="en-US" smtClean="0"/>
-              <a:t>9/26/16</a:t>
+              <a:t>10/6/16</a:t>
             </a:fld>
             <a:endParaRPr lang="en-US"/>
           </a:p>
@@ -425,7 +425,7 @@
           <a:p>
             <a:fld id="{61F798F5-E9CA-274B-A771-0DC0BC9217C2}" type="datetimeFigureOut">
               <a:rPr lang="en-US" smtClean="0"/>
-              <a:t>9/26/16</a:t>
+              <a:t>10/6/16</a:t>
             </a:fld>
             <a:endParaRPr lang="en-US"/>
           </a:p>
@@ -605,7 +605,7 @@
           <a:p>
             <a:fld id="{61F798F5-E9CA-274B-A771-0DC0BC9217C2}" type="datetimeFigureOut">
               <a:rPr lang="en-US" smtClean="0"/>
-              <a:t>9/26/16</a:t>
+              <a:t>10/6/16</a:t>
             </a:fld>
             <a:endParaRPr lang="en-US"/>
           </a:p>
@@ -775,7 +775,7 @@
           <a:p>
             <a:fld id="{61F798F5-E9CA-274B-A771-0DC0BC9217C2}" type="datetimeFigureOut">
               <a:rPr lang="en-US" smtClean="0"/>
-              <a:t>9/26/16</a:t>
+              <a:t>10/6/16</a:t>
             </a:fld>
             <a:endParaRPr lang="en-US"/>
           </a:p>
@@ -1021,7 +1021,7 @@
           <a:p>
             <a:fld id="{61F798F5-E9CA-274B-A771-0DC0BC9217C2}" type="datetimeFigureOut">
               <a:rPr lang="en-US" smtClean="0"/>
-              <a:t>9/26/16</a:t>
+              <a:t>10/6/16</a:t>
             </a:fld>
             <a:endParaRPr lang="en-US"/>
           </a:p>
@@ -1253,7 +1253,7 @@
           <a:p>
             <a:fld id="{61F798F5-E9CA-274B-A771-0DC0BC9217C2}" type="datetimeFigureOut">
               <a:rPr lang="en-US" smtClean="0"/>
-              <a:t>9/26/16</a:t>
+              <a:t>10/6/16</a:t>
             </a:fld>
             <a:endParaRPr lang="en-US"/>
           </a:p>
@@ -1620,7 +1620,7 @@
           <a:p>
             <a:fld id="{61F798F5-E9CA-274B-A771-0DC0BC9217C2}" type="datetimeFigureOut">
               <a:rPr lang="en-US" smtClean="0"/>
-              <a:t>9/26/16</a:t>
+              <a:t>10/6/16</a:t>
             </a:fld>
             <a:endParaRPr lang="en-US"/>
           </a:p>
@@ -1738,7 +1738,7 @@
           <a:p>
             <a:fld id="{61F798F5-E9CA-274B-A771-0DC0BC9217C2}" type="datetimeFigureOut">
               <a:rPr lang="en-US" smtClean="0"/>
-              <a:t>9/26/16</a:t>
+              <a:t>10/6/16</a:t>
             </a:fld>
             <a:endParaRPr lang="en-US"/>
           </a:p>
@@ -1833,7 +1833,7 @@
           <a:p>
             <a:fld id="{61F798F5-E9CA-274B-A771-0DC0BC9217C2}" type="datetimeFigureOut">
               <a:rPr lang="en-US" smtClean="0"/>
-              <a:t>9/26/16</a:t>
+              <a:t>10/6/16</a:t>
             </a:fld>
             <a:endParaRPr lang="en-US"/>
           </a:p>
@@ -2110,7 +2110,7 @@
           <a:p>
             <a:fld id="{61F798F5-E9CA-274B-A771-0DC0BC9217C2}" type="datetimeFigureOut">
               <a:rPr lang="en-US" smtClean="0"/>
-              <a:t>9/26/16</a:t>
+              <a:t>10/6/16</a:t>
             </a:fld>
             <a:endParaRPr lang="en-US"/>
           </a:p>
@@ -2363,7 +2363,7 @@
           <a:p>
             <a:fld id="{61F798F5-E9CA-274B-A771-0DC0BC9217C2}" type="datetimeFigureOut">
               <a:rPr lang="en-US" smtClean="0"/>
-              <a:t>9/26/16</a:t>
+              <a:t>10/6/16</a:t>
             </a:fld>
             <a:endParaRPr lang="en-US"/>
           </a:p>
@@ -2576,7 +2576,7 @@
           <a:p>
             <a:fld id="{61F798F5-E9CA-274B-A771-0DC0BC9217C2}" type="datetimeFigureOut">
               <a:rPr lang="en-US" smtClean="0"/>
-              <a:t>9/26/16</a:t>
+              <a:t>10/6/16</a:t>
             </a:fld>
             <a:endParaRPr lang="en-US"/>
           </a:p>
@@ -3111,7 +3111,7 @@
                 <a:ea typeface="Times New Roman" charset="0"/>
                 <a:cs typeface="Times New Roman" charset="0"/>
               </a:rPr>
-              <a:t>Sa</a:t>
+              <a:t>S</a:t>
             </a:r>
             <a:endParaRPr lang="en-US" dirty="0">
               <a:latin typeface="Times New Roman" charset="0"/>
@@ -3149,7 +3149,7 @@
                 <a:ea typeface="Times New Roman" charset="0"/>
                 <a:cs typeface="Times New Roman" charset="0"/>
               </a:rPr>
-              <a:t>Ma</a:t>
+              <a:t>m</a:t>
             </a:r>
             <a:endParaRPr lang="en-US" dirty="0">
               <a:latin typeface="Times New Roman" charset="0"/>
@@ -3187,7 +3187,7 @@
                 <a:ea typeface="Times New Roman" charset="0"/>
                 <a:cs typeface="Times New Roman" charset="0"/>
               </a:rPr>
-              <a:t>Ga</a:t>
+              <a:t>g</a:t>
             </a:r>
             <a:endParaRPr lang="en-US" dirty="0">
               <a:latin typeface="Times New Roman" charset="0"/>
@@ -3357,7 +3357,7 @@
                 <a:ea typeface="Times New Roman" charset="0"/>
                 <a:cs typeface="Times New Roman" charset="0"/>
               </a:rPr>
-              <a:t>Sa</a:t>
+              <a:t>S</a:t>
             </a:r>
             <a:endParaRPr lang="en-US" dirty="0">
               <a:latin typeface="Times New Roman" charset="0"/>
@@ -3390,12 +3390,12 @@
           <a:lstStyle/>
           <a:p>
             <a:r>
-              <a:rPr lang="en-US" dirty="0" smtClean="0">
+              <a:rPr lang="en-US" dirty="0">
                 <a:latin typeface="Times New Roman" charset="0"/>
                 <a:ea typeface="Times New Roman" charset="0"/>
                 <a:cs typeface="Times New Roman" charset="0"/>
               </a:rPr>
-              <a:t>Ma</a:t>
+              <a:t>m</a:t>
             </a:r>
             <a:endParaRPr lang="en-US" dirty="0">
               <a:latin typeface="Times New Roman" charset="0"/>
@@ -3433,7 +3433,7 @@
                 <a:ea typeface="Times New Roman" charset="0"/>
                 <a:cs typeface="Times New Roman" charset="0"/>
               </a:rPr>
-              <a:t>Ga</a:t>
+              <a:t>g</a:t>
             </a:r>
             <a:endParaRPr lang="en-US" dirty="0">
               <a:latin typeface="Times New Roman" charset="0"/>

</xml_diff>